<commit_message>
Add litre plots for keep, orig, remove, add examples
</commit_message>
<xml_diff>
--- a/Dashboards/exampleLitrePlots.pptx
+++ b/Dashboards/exampleLitrePlots.pptx
@@ -7,6 +7,8 @@
   <p:sldIdLst>
     <p:sldId id="256" r:id="rId2"/>
     <p:sldId id="257" r:id="rId3"/>
+    <p:sldId id="258" r:id="rId4"/>
+    <p:sldId id="259" r:id="rId5"/>
   </p:sldIdLst>
   <p:sldSz cx="12192000" cy="18288000"/>
   <p:notesSz cx="6858000" cy="9144000"/>
@@ -2912,66 +2914,141 @@
           <a:chExt cx="0" cy="0"/>
         </a:xfrm>
       </p:grpSpPr>
-      <p:pic>
-        <p:nvPicPr>
-          <p:cNvPr id="6" name="Picture 5"/>
-          <p:cNvPicPr>
-            <a:picLocks noChangeAspect="1"/>
-          </p:cNvPicPr>
+      <p:grpSp>
+        <p:nvGrpSpPr>
+          <p:cNvPr id="14" name="Group 13"/>
+          <p:cNvGrpSpPr/>
           <p:nvPr/>
-        </p:nvPicPr>
-        <p:blipFill>
-          <a:blip r:embed="rId2">
-            <a:extLst>
-              <a:ext uri="{28A0092B-C50C-407E-A947-70E740481C1C}">
-                <a14:useLocalDpi xmlns:a14="http://schemas.microsoft.com/office/drawing/2010/main" val="0"/>
-              </a:ext>
-            </a:extLst>
-          </a:blip>
-          <a:stretch>
-            <a:fillRect/>
-          </a:stretch>
-        </p:blipFill>
-        <p:spPr>
+        </p:nvGrpSpPr>
+        <p:grpSpPr>
           <a:xfrm>
-            <a:off x="2606040" y="365760"/>
-            <a:ext cx="6845300" cy="5080000"/>
+            <a:off x="2651760" y="731520"/>
+            <a:ext cx="6873240" cy="10180320"/>
+            <a:chOff x="2651760" y="731520"/>
+            <a:chExt cx="6873240" cy="10180320"/>
           </a:xfrm>
-          <a:prstGeom prst="rect">
-            <a:avLst/>
-          </a:prstGeom>
-        </p:spPr>
-      </p:pic>
-      <p:pic>
-        <p:nvPicPr>
-          <p:cNvPr id="7" name="Picture 6"/>
-          <p:cNvPicPr>
-            <a:picLocks noChangeAspect="1"/>
-          </p:cNvPicPr>
-          <p:nvPr/>
-        </p:nvPicPr>
-        <p:blipFill>
-          <a:blip r:embed="rId3">
-            <a:extLst>
-              <a:ext uri="{28A0092B-C50C-407E-A947-70E740481C1C}">
-                <a14:useLocalDpi xmlns:a14="http://schemas.microsoft.com/office/drawing/2010/main" val="0"/>
-              </a:ext>
-            </a:extLst>
-          </a:blip>
-          <a:stretch>
-            <a:fillRect/>
-          </a:stretch>
-        </p:blipFill>
-        <p:spPr>
-          <a:xfrm>
-            <a:off x="2606040" y="5445760"/>
-            <a:ext cx="6845300" cy="5080000"/>
-          </a:xfrm>
-          <a:prstGeom prst="rect">
-            <a:avLst/>
-          </a:prstGeom>
-        </p:spPr>
-      </p:pic>
+        </p:grpSpPr>
+        <p:pic>
+          <p:nvPicPr>
+            <p:cNvPr id="8" name="Picture 7"/>
+            <p:cNvPicPr>
+              <a:picLocks noChangeAspect="1"/>
+            </p:cNvPicPr>
+            <p:nvPr/>
+          </p:nvPicPr>
+          <p:blipFill>
+            <a:blip r:embed="rId2">
+              <a:extLst>
+                <a:ext uri="{28A0092B-C50C-407E-A947-70E740481C1C}">
+                  <a14:useLocalDpi xmlns:a14="http://schemas.microsoft.com/office/drawing/2010/main" val="0"/>
+                </a:ext>
+              </a:extLst>
+            </a:blip>
+            <a:stretch>
+              <a:fillRect/>
+            </a:stretch>
+          </p:blipFill>
+          <p:spPr>
+            <a:xfrm>
+              <a:off x="2654300" y="5831840"/>
+              <a:ext cx="6870700" cy="5080000"/>
+            </a:xfrm>
+            <a:prstGeom prst="rect">
+              <a:avLst/>
+            </a:prstGeom>
+          </p:spPr>
+        </p:pic>
+        <p:pic>
+          <p:nvPicPr>
+            <p:cNvPr id="9" name="Picture 8"/>
+            <p:cNvPicPr>
+              <a:picLocks noChangeAspect="1"/>
+            </p:cNvPicPr>
+            <p:nvPr/>
+          </p:nvPicPr>
+          <p:blipFill>
+            <a:blip r:embed="rId3">
+              <a:extLst>
+                <a:ext uri="{28A0092B-C50C-407E-A947-70E740481C1C}">
+                  <a14:useLocalDpi xmlns:a14="http://schemas.microsoft.com/office/drawing/2010/main" val="0"/>
+                </a:ext>
+              </a:extLst>
+            </a:blip>
+            <a:stretch>
+              <a:fillRect/>
+            </a:stretch>
+          </p:blipFill>
+          <p:spPr>
+            <a:xfrm>
+              <a:off x="2654300" y="751840"/>
+              <a:ext cx="6870700" cy="5080000"/>
+            </a:xfrm>
+            <a:prstGeom prst="rect">
+              <a:avLst/>
+            </a:prstGeom>
+          </p:spPr>
+        </p:pic>
+        <p:sp>
+          <p:nvSpPr>
+            <p:cNvPr id="10" name="TextBox 9"/>
+            <p:cNvSpPr txBox="1"/>
+            <p:nvPr/>
+          </p:nvSpPr>
+          <p:spPr>
+            <a:xfrm>
+              <a:off x="2654300" y="731520"/>
+              <a:ext cx="370614" cy="461665"/>
+            </a:xfrm>
+            <a:prstGeom prst="rect">
+              <a:avLst/>
+            </a:prstGeom>
+            <a:noFill/>
+          </p:spPr>
+          <p:txBody>
+            <a:bodyPr wrap="none" rtlCol="0">
+              <a:spAutoFit/>
+            </a:bodyPr>
+            <a:lstStyle/>
+            <a:p>
+              <a:r>
+                <a:rPr lang="en-US" sz="2400" b="1" dirty="0" smtClean="0"/>
+                <a:t>A</a:t>
+              </a:r>
+              <a:endParaRPr lang="en-US" sz="2400" b="1" dirty="0"/>
+            </a:p>
+          </p:txBody>
+        </p:sp>
+        <p:sp>
+          <p:nvSpPr>
+            <p:cNvPr id="11" name="TextBox 10"/>
+            <p:cNvSpPr txBox="1"/>
+            <p:nvPr/>
+          </p:nvSpPr>
+          <p:spPr>
+            <a:xfrm>
+              <a:off x="2651760" y="5806440"/>
+              <a:ext cx="357790" cy="461665"/>
+            </a:xfrm>
+            <a:prstGeom prst="rect">
+              <a:avLst/>
+            </a:prstGeom>
+            <a:noFill/>
+          </p:spPr>
+          <p:txBody>
+            <a:bodyPr wrap="none" rtlCol="0">
+              <a:spAutoFit/>
+            </a:bodyPr>
+            <a:lstStyle/>
+            <a:p>
+              <a:r>
+                <a:rPr lang="en-US" sz="2400" b="1" dirty="0"/>
+                <a:t>B</a:t>
+              </a:r>
+              <a:endParaRPr lang="en-US" sz="2400" b="1" dirty="0"/>
+            </a:p>
+          </p:txBody>
+        </p:sp>
+      </p:grpSp>
     </p:spTree>
     <p:extLst>
       <p:ext uri="{BB962C8B-B14F-4D97-AF65-F5344CB8AC3E}">
@@ -3002,10 +3079,473 @@
           <a:chExt cx="0" cy="0"/>
         </a:xfrm>
       </p:grpSpPr>
+      <p:grpSp>
+        <p:nvGrpSpPr>
+          <p:cNvPr id="10" name="Group 9"/>
+          <p:cNvGrpSpPr/>
+          <p:nvPr/>
+        </p:nvGrpSpPr>
+        <p:grpSpPr>
+          <a:xfrm>
+            <a:off x="2705100" y="467360"/>
+            <a:ext cx="6781800" cy="10160000"/>
+            <a:chOff x="2705100" y="467360"/>
+            <a:chExt cx="6781800" cy="10160000"/>
+          </a:xfrm>
+        </p:grpSpPr>
+        <p:pic>
+          <p:nvPicPr>
+            <p:cNvPr id="5" name="Picture 4"/>
+            <p:cNvPicPr>
+              <a:picLocks noChangeAspect="1"/>
+            </p:cNvPicPr>
+            <p:nvPr/>
+          </p:nvPicPr>
+          <p:blipFill>
+            <a:blip r:embed="rId2">
+              <a:extLst>
+                <a:ext uri="{28A0092B-C50C-407E-A947-70E740481C1C}">
+                  <a14:useLocalDpi xmlns:a14="http://schemas.microsoft.com/office/drawing/2010/main" val="0"/>
+                </a:ext>
+              </a:extLst>
+            </a:blip>
+            <a:stretch>
+              <a:fillRect/>
+            </a:stretch>
+          </p:blipFill>
+          <p:spPr>
+            <a:xfrm>
+              <a:off x="2705100" y="5547360"/>
+              <a:ext cx="6781800" cy="5080000"/>
+            </a:xfrm>
+            <a:prstGeom prst="rect">
+              <a:avLst/>
+            </a:prstGeom>
+          </p:spPr>
+        </p:pic>
+        <p:pic>
+          <p:nvPicPr>
+            <p:cNvPr id="6" name="Picture 5"/>
+            <p:cNvPicPr>
+              <a:picLocks noChangeAspect="1"/>
+            </p:cNvPicPr>
+            <p:nvPr/>
+          </p:nvPicPr>
+          <p:blipFill>
+            <a:blip r:embed="rId3">
+              <a:extLst>
+                <a:ext uri="{28A0092B-C50C-407E-A947-70E740481C1C}">
+                  <a14:useLocalDpi xmlns:a14="http://schemas.microsoft.com/office/drawing/2010/main" val="0"/>
+                </a:ext>
+              </a:extLst>
+            </a:blip>
+            <a:stretch>
+              <a:fillRect/>
+            </a:stretch>
+          </p:blipFill>
+          <p:spPr>
+            <a:xfrm>
+              <a:off x="2705100" y="467360"/>
+              <a:ext cx="6781800" cy="5080000"/>
+            </a:xfrm>
+            <a:prstGeom prst="rect">
+              <a:avLst/>
+            </a:prstGeom>
+          </p:spPr>
+        </p:pic>
+        <p:sp>
+          <p:nvSpPr>
+            <p:cNvPr id="8" name="TextBox 7"/>
+            <p:cNvSpPr txBox="1"/>
+            <p:nvPr/>
+          </p:nvSpPr>
+          <p:spPr>
+            <a:xfrm>
+              <a:off x="2707640" y="472440"/>
+              <a:ext cx="370614" cy="461665"/>
+            </a:xfrm>
+            <a:prstGeom prst="rect">
+              <a:avLst/>
+            </a:prstGeom>
+            <a:noFill/>
+          </p:spPr>
+          <p:txBody>
+            <a:bodyPr wrap="none" rtlCol="0">
+              <a:spAutoFit/>
+            </a:bodyPr>
+            <a:lstStyle/>
+            <a:p>
+              <a:r>
+                <a:rPr lang="en-US" sz="2400" b="1" dirty="0" smtClean="0"/>
+                <a:t>A</a:t>
+              </a:r>
+              <a:endParaRPr lang="en-US" sz="2400" b="1" dirty="0"/>
+            </a:p>
+          </p:txBody>
+        </p:sp>
+        <p:sp>
+          <p:nvSpPr>
+            <p:cNvPr id="9" name="TextBox 8"/>
+            <p:cNvSpPr txBox="1"/>
+            <p:nvPr/>
+          </p:nvSpPr>
+          <p:spPr>
+            <a:xfrm>
+              <a:off x="2705100" y="5547360"/>
+              <a:ext cx="357790" cy="461665"/>
+            </a:xfrm>
+            <a:prstGeom prst="rect">
+              <a:avLst/>
+            </a:prstGeom>
+            <a:noFill/>
+          </p:spPr>
+          <p:txBody>
+            <a:bodyPr wrap="none" rtlCol="0">
+              <a:spAutoFit/>
+            </a:bodyPr>
+            <a:lstStyle/>
+            <a:p>
+              <a:r>
+                <a:rPr lang="en-US" sz="2400" b="1" dirty="0"/>
+                <a:t>B</a:t>
+              </a:r>
+              <a:endParaRPr lang="en-US" sz="2400" b="1" dirty="0"/>
+            </a:p>
+          </p:txBody>
+        </p:sp>
+      </p:grpSp>
     </p:spTree>
     <p:extLst>
       <p:ext uri="{BB962C8B-B14F-4D97-AF65-F5344CB8AC3E}">
         <p14:creationId xmlns:p14="http://schemas.microsoft.com/office/powerpoint/2010/main" val="132757733"/>
+      </p:ext>
+    </p:extLst>
+  </p:cSld>
+  <p:clrMapOvr>
+    <a:masterClrMapping/>
+  </p:clrMapOvr>
+</p:sld>
+</file>
+
+<file path=ppt/slides/slide3.xml><?xml version="1.0" encoding="utf-8"?>
+<p:sld xmlns:a="http://schemas.openxmlformats.org/drawingml/2006/main" xmlns:r="http://schemas.openxmlformats.org/officeDocument/2006/relationships" xmlns:p="http://schemas.openxmlformats.org/presentationml/2006/main">
+  <p:cSld>
+    <p:spTree>
+      <p:nvGrpSpPr>
+        <p:cNvPr id="1" name=""/>
+        <p:cNvGrpSpPr/>
+        <p:nvPr/>
+      </p:nvGrpSpPr>
+      <p:grpSpPr>
+        <a:xfrm>
+          <a:off x="0" y="0"/>
+          <a:ext cx="0" cy="0"/>
+          <a:chOff x="0" y="0"/>
+          <a:chExt cx="0" cy="0"/>
+        </a:xfrm>
+      </p:grpSpPr>
+      <p:grpSp>
+        <p:nvGrpSpPr>
+          <p:cNvPr id="8" name="Group 7"/>
+          <p:cNvGrpSpPr/>
+          <p:nvPr/>
+        </p:nvGrpSpPr>
+        <p:grpSpPr>
+          <a:xfrm>
+            <a:off x="2692400" y="528320"/>
+            <a:ext cx="6794500" cy="10160000"/>
+            <a:chOff x="2692400" y="528320"/>
+            <a:chExt cx="6794500" cy="10160000"/>
+          </a:xfrm>
+        </p:grpSpPr>
+        <p:pic>
+          <p:nvPicPr>
+            <p:cNvPr id="4" name="Picture 3"/>
+            <p:cNvPicPr>
+              <a:picLocks noChangeAspect="1"/>
+            </p:cNvPicPr>
+            <p:nvPr/>
+          </p:nvPicPr>
+          <p:blipFill>
+            <a:blip r:embed="rId2">
+              <a:extLst>
+                <a:ext uri="{28A0092B-C50C-407E-A947-70E740481C1C}">
+                  <a14:useLocalDpi xmlns:a14="http://schemas.microsoft.com/office/drawing/2010/main" val="0"/>
+                </a:ext>
+              </a:extLst>
+            </a:blip>
+            <a:stretch>
+              <a:fillRect/>
+            </a:stretch>
+          </p:blipFill>
+          <p:spPr>
+            <a:xfrm>
+              <a:off x="2692400" y="5608320"/>
+              <a:ext cx="6794500" cy="5080000"/>
+            </a:xfrm>
+            <a:prstGeom prst="rect">
+              <a:avLst/>
+            </a:prstGeom>
+          </p:spPr>
+        </p:pic>
+        <p:pic>
+          <p:nvPicPr>
+            <p:cNvPr id="5" name="Picture 4"/>
+            <p:cNvPicPr>
+              <a:picLocks noChangeAspect="1"/>
+            </p:cNvPicPr>
+            <p:nvPr/>
+          </p:nvPicPr>
+          <p:blipFill>
+            <a:blip r:embed="rId3">
+              <a:extLst>
+                <a:ext uri="{28A0092B-C50C-407E-A947-70E740481C1C}">
+                  <a14:useLocalDpi xmlns:a14="http://schemas.microsoft.com/office/drawing/2010/main" val="0"/>
+                </a:ext>
+              </a:extLst>
+            </a:blip>
+            <a:stretch>
+              <a:fillRect/>
+            </a:stretch>
+          </p:blipFill>
+          <p:spPr>
+            <a:xfrm>
+              <a:off x="2692400" y="528320"/>
+              <a:ext cx="6794500" cy="5080000"/>
+            </a:xfrm>
+            <a:prstGeom prst="rect">
+              <a:avLst/>
+            </a:prstGeom>
+          </p:spPr>
+        </p:pic>
+        <p:sp>
+          <p:nvSpPr>
+            <p:cNvPr id="6" name="TextBox 5"/>
+            <p:cNvSpPr txBox="1"/>
+            <p:nvPr/>
+          </p:nvSpPr>
+          <p:spPr>
+            <a:xfrm>
+              <a:off x="2694940" y="533400"/>
+              <a:ext cx="370614" cy="461665"/>
+            </a:xfrm>
+            <a:prstGeom prst="rect">
+              <a:avLst/>
+            </a:prstGeom>
+            <a:noFill/>
+          </p:spPr>
+          <p:txBody>
+            <a:bodyPr wrap="none" rtlCol="0">
+              <a:spAutoFit/>
+            </a:bodyPr>
+            <a:lstStyle/>
+            <a:p>
+              <a:r>
+                <a:rPr lang="en-US" sz="2400" b="1" dirty="0" smtClean="0"/>
+                <a:t>A</a:t>
+              </a:r>
+              <a:endParaRPr lang="en-US" sz="2400" b="1" dirty="0"/>
+            </a:p>
+          </p:txBody>
+        </p:sp>
+        <p:sp>
+          <p:nvSpPr>
+            <p:cNvPr id="7" name="TextBox 6"/>
+            <p:cNvSpPr txBox="1"/>
+            <p:nvPr/>
+          </p:nvSpPr>
+          <p:spPr>
+            <a:xfrm>
+              <a:off x="2692400" y="5608320"/>
+              <a:ext cx="357790" cy="461665"/>
+            </a:xfrm>
+            <a:prstGeom prst="rect">
+              <a:avLst/>
+            </a:prstGeom>
+            <a:noFill/>
+          </p:spPr>
+          <p:txBody>
+            <a:bodyPr wrap="none" rtlCol="0">
+              <a:spAutoFit/>
+            </a:bodyPr>
+            <a:lstStyle/>
+            <a:p>
+              <a:r>
+                <a:rPr lang="en-US" sz="2400" b="1" dirty="0"/>
+                <a:t>B</a:t>
+              </a:r>
+              <a:endParaRPr lang="en-US" sz="2400" b="1" dirty="0"/>
+            </a:p>
+          </p:txBody>
+        </p:sp>
+      </p:grpSp>
+    </p:spTree>
+    <p:extLst>
+      <p:ext uri="{BB962C8B-B14F-4D97-AF65-F5344CB8AC3E}">
+        <p14:creationId xmlns:p14="http://schemas.microsoft.com/office/powerpoint/2010/main" val="1923336356"/>
+      </p:ext>
+    </p:extLst>
+  </p:cSld>
+  <p:clrMapOvr>
+    <a:masterClrMapping/>
+  </p:clrMapOvr>
+</p:sld>
+</file>
+
+<file path=ppt/slides/slide4.xml><?xml version="1.0" encoding="utf-8"?>
+<p:sld xmlns:a="http://schemas.openxmlformats.org/drawingml/2006/main" xmlns:r="http://schemas.openxmlformats.org/officeDocument/2006/relationships" xmlns:p="http://schemas.openxmlformats.org/presentationml/2006/main">
+  <p:cSld>
+    <p:spTree>
+      <p:nvGrpSpPr>
+        <p:cNvPr id="1" name=""/>
+        <p:cNvGrpSpPr/>
+        <p:nvPr/>
+      </p:nvGrpSpPr>
+      <p:grpSpPr>
+        <a:xfrm>
+          <a:off x="0" y="0"/>
+          <a:ext cx="0" cy="0"/>
+          <a:chOff x="0" y="0"/>
+          <a:chExt cx="0" cy="0"/>
+        </a:xfrm>
+      </p:grpSpPr>
+      <p:grpSp>
+        <p:nvGrpSpPr>
+          <p:cNvPr id="8" name="Group 7"/>
+          <p:cNvGrpSpPr/>
+          <p:nvPr/>
+        </p:nvGrpSpPr>
+        <p:grpSpPr>
+          <a:xfrm>
+            <a:off x="2679700" y="548640"/>
+            <a:ext cx="6819900" cy="10160000"/>
+            <a:chOff x="2679700" y="548640"/>
+            <a:chExt cx="6819900" cy="10160000"/>
+          </a:xfrm>
+        </p:grpSpPr>
+        <p:pic>
+          <p:nvPicPr>
+            <p:cNvPr id="4" name="Picture 3"/>
+            <p:cNvPicPr>
+              <a:picLocks noChangeAspect="1"/>
+            </p:cNvPicPr>
+            <p:nvPr/>
+          </p:nvPicPr>
+          <p:blipFill rotWithShape="1">
+            <a:blip r:embed="rId2">
+              <a:extLst>
+                <a:ext uri="{28A0092B-C50C-407E-A947-70E740481C1C}">
+                  <a14:useLocalDpi xmlns:a14="http://schemas.microsoft.com/office/drawing/2010/main" val="0"/>
+                </a:ext>
+              </a:extLst>
+            </a:blip>
+            <a:srcRect l="-1341" r="1341"/>
+            <a:stretch/>
+          </p:blipFill>
+          <p:spPr>
+            <a:xfrm>
+              <a:off x="2679700" y="5628640"/>
+              <a:ext cx="6819900" cy="5080000"/>
+            </a:xfrm>
+            <a:prstGeom prst="rect">
+              <a:avLst/>
+            </a:prstGeom>
+          </p:spPr>
+        </p:pic>
+        <p:pic>
+          <p:nvPicPr>
+            <p:cNvPr id="5" name="Picture 4"/>
+            <p:cNvPicPr>
+              <a:picLocks noChangeAspect="1"/>
+            </p:cNvPicPr>
+            <p:nvPr/>
+          </p:nvPicPr>
+          <p:blipFill rotWithShape="1">
+            <a:blip r:embed="rId3">
+              <a:extLst>
+                <a:ext uri="{28A0092B-C50C-407E-A947-70E740481C1C}">
+                  <a14:useLocalDpi xmlns:a14="http://schemas.microsoft.com/office/drawing/2010/main" val="0"/>
+                </a:ext>
+              </a:extLst>
+            </a:blip>
+            <a:srcRect l="-1341" r="1341"/>
+            <a:stretch/>
+          </p:blipFill>
+          <p:spPr>
+            <a:xfrm>
+              <a:off x="2679700" y="548640"/>
+              <a:ext cx="6819900" cy="5080000"/>
+            </a:xfrm>
+            <a:prstGeom prst="rect">
+              <a:avLst/>
+            </a:prstGeom>
+          </p:spPr>
+        </p:pic>
+        <p:sp>
+          <p:nvSpPr>
+            <p:cNvPr id="6" name="TextBox 5"/>
+            <p:cNvSpPr txBox="1"/>
+            <p:nvPr/>
+          </p:nvSpPr>
+          <p:spPr>
+            <a:xfrm>
+              <a:off x="2743200" y="557784"/>
+              <a:ext cx="370614" cy="461665"/>
+            </a:xfrm>
+            <a:prstGeom prst="rect">
+              <a:avLst/>
+            </a:prstGeom>
+            <a:noFill/>
+          </p:spPr>
+          <p:txBody>
+            <a:bodyPr wrap="none" rtlCol="0">
+              <a:spAutoFit/>
+            </a:bodyPr>
+            <a:lstStyle/>
+            <a:p>
+              <a:r>
+                <a:rPr lang="en-US" sz="2400" b="1" dirty="0" smtClean="0"/>
+                <a:t>A</a:t>
+              </a:r>
+              <a:endParaRPr lang="en-US" sz="2400" b="1" dirty="0"/>
+            </a:p>
+          </p:txBody>
+        </p:sp>
+        <p:sp>
+          <p:nvSpPr>
+            <p:cNvPr id="7" name="TextBox 6"/>
+            <p:cNvSpPr txBox="1"/>
+            <p:nvPr/>
+          </p:nvSpPr>
+          <p:spPr>
+            <a:xfrm>
+              <a:off x="2743200" y="5632704"/>
+              <a:ext cx="357790" cy="461665"/>
+            </a:xfrm>
+            <a:prstGeom prst="rect">
+              <a:avLst/>
+            </a:prstGeom>
+            <a:noFill/>
+          </p:spPr>
+          <p:txBody>
+            <a:bodyPr wrap="none" rtlCol="0">
+              <a:spAutoFit/>
+            </a:bodyPr>
+            <a:lstStyle/>
+            <a:p>
+              <a:r>
+                <a:rPr lang="en-US" sz="2400" b="1" dirty="0"/>
+                <a:t>B</a:t>
+              </a:r>
+              <a:endParaRPr lang="en-US" sz="2400" b="1" dirty="0"/>
+            </a:p>
+          </p:txBody>
+        </p:sp>
+      </p:grpSp>
+    </p:spTree>
+    <p:extLst>
+      <p:ext uri="{BB962C8B-B14F-4D97-AF65-F5344CB8AC3E}">
+        <p14:creationId xmlns:p14="http://schemas.microsoft.com/office/powerpoint/2010/main" val="1816098557"/>
       </p:ext>
     </p:extLst>
   </p:cSld>

</xml_diff>

<commit_message>
Added standardized liter plots to supp.tex
</commit_message>
<xml_diff>
--- a/Dashboards/exampleLitrePlots.pptx
+++ b/Dashboards/exampleLitrePlots.pptx
@@ -9,6 +9,10 @@
     <p:sldId id="257" r:id="rId3"/>
     <p:sldId id="258" r:id="rId4"/>
     <p:sldId id="259" r:id="rId5"/>
+    <p:sldId id="260" r:id="rId6"/>
+    <p:sldId id="261" r:id="rId7"/>
+    <p:sldId id="262" r:id="rId8"/>
+    <p:sldId id="263" r:id="rId9"/>
   </p:sldIdLst>
   <p:sldSz cx="12192000" cy="18288000"/>
   <p:notesSz cx="6858000" cy="9144000"/>
@@ -107,6 +111,11 @@
       </a:defRPr>
     </a:lvl9pPr>
   </p:defaultTextStyle>
+  <p:extLst>
+    <p:ext uri="{EFAFB233-063F-42B5-8137-9DF3F51BA10A}">
+      <p15:sldGuideLst xmlns:p15="http://schemas.microsoft.com/office/powerpoint/2012/main"/>
+    </p:ext>
+  </p:extLst>
 </p:presentation>
 </file>
 
@@ -241,7 +250,7 @@
           <a:p>
             <a:fld id="{9516826D-2316-7B40-9A49-E9C2372D45D8}" type="datetimeFigureOut">
               <a:rPr lang="en-US" smtClean="0"/>
-              <a:t>3/6/18</a:t>
+              <a:t>3/16/18</a:t>
             </a:fld>
             <a:endParaRPr lang="en-US"/>
           </a:p>
@@ -406,7 +415,7 @@
           <a:p>
             <a:fld id="{9516826D-2316-7B40-9A49-E9C2372D45D8}" type="datetimeFigureOut">
               <a:rPr lang="en-US" smtClean="0"/>
-              <a:t>3/6/18</a:t>
+              <a:t>3/16/18</a:t>
             </a:fld>
             <a:endParaRPr lang="en-US"/>
           </a:p>
@@ -581,7 +590,7 @@
           <a:p>
             <a:fld id="{9516826D-2316-7B40-9A49-E9C2372D45D8}" type="datetimeFigureOut">
               <a:rPr lang="en-US" smtClean="0"/>
-              <a:t>3/6/18</a:t>
+              <a:t>3/16/18</a:t>
             </a:fld>
             <a:endParaRPr lang="en-US"/>
           </a:p>
@@ -746,7 +755,7 @@
           <a:p>
             <a:fld id="{9516826D-2316-7B40-9A49-E9C2372D45D8}" type="datetimeFigureOut">
               <a:rPr lang="en-US" smtClean="0"/>
-              <a:t>3/6/18</a:t>
+              <a:t>3/16/18</a:t>
             </a:fld>
             <a:endParaRPr lang="en-US"/>
           </a:p>
@@ -985,7 +994,7 @@
           <a:p>
             <a:fld id="{9516826D-2316-7B40-9A49-E9C2372D45D8}" type="datetimeFigureOut">
               <a:rPr lang="en-US" smtClean="0"/>
-              <a:t>3/6/18</a:t>
+              <a:t>3/16/18</a:t>
             </a:fld>
             <a:endParaRPr lang="en-US"/>
           </a:p>
@@ -1212,7 +1221,7 @@
           <a:p>
             <a:fld id="{9516826D-2316-7B40-9A49-E9C2372D45D8}" type="datetimeFigureOut">
               <a:rPr lang="en-US" smtClean="0"/>
-              <a:t>3/6/18</a:t>
+              <a:t>3/16/18</a:t>
             </a:fld>
             <a:endParaRPr lang="en-US"/>
           </a:p>
@@ -1574,7 +1583,7 @@
           <a:p>
             <a:fld id="{9516826D-2316-7B40-9A49-E9C2372D45D8}" type="datetimeFigureOut">
               <a:rPr lang="en-US" smtClean="0"/>
-              <a:t>3/6/18</a:t>
+              <a:t>3/16/18</a:t>
             </a:fld>
             <a:endParaRPr lang="en-US"/>
           </a:p>
@@ -1687,7 +1696,7 @@
           <a:p>
             <a:fld id="{9516826D-2316-7B40-9A49-E9C2372D45D8}" type="datetimeFigureOut">
               <a:rPr lang="en-US" smtClean="0"/>
-              <a:t>3/6/18</a:t>
+              <a:t>3/16/18</a:t>
             </a:fld>
             <a:endParaRPr lang="en-US"/>
           </a:p>
@@ -1777,7 +1786,7 @@
           <a:p>
             <a:fld id="{9516826D-2316-7B40-9A49-E9C2372D45D8}" type="datetimeFigureOut">
               <a:rPr lang="en-US" smtClean="0"/>
-              <a:t>3/6/18</a:t>
+              <a:t>3/16/18</a:t>
             </a:fld>
             <a:endParaRPr lang="en-US"/>
           </a:p>
@@ -2049,7 +2058,7 @@
           <a:p>
             <a:fld id="{9516826D-2316-7B40-9A49-E9C2372D45D8}" type="datetimeFigureOut">
               <a:rPr lang="en-US" smtClean="0"/>
-              <a:t>3/6/18</a:t>
+              <a:t>3/16/18</a:t>
             </a:fld>
             <a:endParaRPr lang="en-US"/>
           </a:p>
@@ -2301,7 +2310,7 @@
           <a:p>
             <a:fld id="{9516826D-2316-7B40-9A49-E9C2372D45D8}" type="datetimeFigureOut">
               <a:rPr lang="en-US" smtClean="0"/>
-              <a:t>3/6/18</a:t>
+              <a:t>3/16/18</a:t>
             </a:fld>
             <a:endParaRPr lang="en-US"/>
           </a:p>
@@ -2509,7 +2518,7 @@
           <a:p>
             <a:fld id="{9516826D-2316-7B40-9A49-E9C2372D45D8}" type="datetimeFigureOut">
               <a:rPr lang="en-US" smtClean="0"/>
-              <a:t>3/6/18</a:t>
+              <a:t>3/16/18</a:t>
             </a:fld>
             <a:endParaRPr lang="en-US"/>
           </a:p>
@@ -3044,7 +3053,6 @@
                 <a:rPr lang="en-US" sz="2400" b="1" dirty="0"/>
                 <a:t>B</a:t>
               </a:r>
-              <a:endParaRPr lang="en-US" sz="2400" b="1" dirty="0"/>
             </a:p>
           </p:txBody>
         </p:sp>
@@ -3209,7 +3217,6 @@
                 <a:rPr lang="en-US" sz="2400" b="1" dirty="0"/>
                 <a:t>B</a:t>
               </a:r>
-              <a:endParaRPr lang="en-US" sz="2400" b="1" dirty="0"/>
             </a:p>
           </p:txBody>
         </p:sp>
@@ -3374,7 +3381,6 @@
                 <a:rPr lang="en-US" sz="2400" b="1" dirty="0"/>
                 <a:t>B</a:t>
               </a:r>
-              <a:endParaRPr lang="en-US" sz="2400" b="1" dirty="0"/>
             </a:p>
           </p:txBody>
         </p:sp>
@@ -3537,7 +3543,6 @@
                 <a:rPr lang="en-US" sz="2400" b="1" dirty="0"/>
                 <a:t>B</a:t>
               </a:r>
-              <a:endParaRPr lang="en-US" sz="2400" b="1" dirty="0"/>
             </a:p>
           </p:txBody>
         </p:sp>
@@ -3546,6 +3551,1260 @@
     <p:extLst>
       <p:ext uri="{BB962C8B-B14F-4D97-AF65-F5344CB8AC3E}">
         <p14:creationId xmlns:p14="http://schemas.microsoft.com/office/powerpoint/2010/main" val="1816098557"/>
+      </p:ext>
+    </p:extLst>
+  </p:cSld>
+  <p:clrMapOvr>
+    <a:masterClrMapping/>
+  </p:clrMapOvr>
+</p:sld>
+</file>
+
+<file path=ppt/slides/slide5.xml><?xml version="1.0" encoding="utf-8"?>
+<p:sld xmlns:a="http://schemas.openxmlformats.org/drawingml/2006/main" xmlns:r="http://schemas.openxmlformats.org/officeDocument/2006/relationships" xmlns:p="http://schemas.openxmlformats.org/presentationml/2006/main">
+  <p:cSld>
+    <p:spTree>
+      <p:nvGrpSpPr>
+        <p:cNvPr id="1" name=""/>
+        <p:cNvGrpSpPr/>
+        <p:nvPr/>
+      </p:nvGrpSpPr>
+      <p:grpSpPr>
+        <a:xfrm>
+          <a:off x="0" y="0"/>
+          <a:ext cx="0" cy="0"/>
+          <a:chOff x="0" y="0"/>
+          <a:chExt cx="0" cy="0"/>
+        </a:xfrm>
+      </p:grpSpPr>
+      <p:grpSp>
+        <p:nvGrpSpPr>
+          <p:cNvPr id="7" name="Group 6"/>
+          <p:cNvGrpSpPr/>
+          <p:nvPr/>
+        </p:nvGrpSpPr>
+        <p:grpSpPr>
+          <a:xfrm>
+            <a:off x="2514600" y="2377440"/>
+            <a:ext cx="7162800" cy="10131552"/>
+            <a:chOff x="2514600" y="2377440"/>
+            <a:chExt cx="7162800" cy="10131552"/>
+          </a:xfrm>
+        </p:grpSpPr>
+        <p:pic>
+          <p:nvPicPr>
+            <p:cNvPr id="5" name="Picture 4"/>
+            <p:cNvPicPr>
+              <a:picLocks noChangeAspect="1"/>
+            </p:cNvPicPr>
+            <p:nvPr/>
+          </p:nvPicPr>
+          <p:blipFill rotWithShape="1">
+            <a:blip r:embed="rId2">
+              <a:extLst>
+                <a:ext uri="{28A0092B-C50C-407E-A947-70E740481C1C}">
+                  <a14:useLocalDpi xmlns:a14="http://schemas.microsoft.com/office/drawing/2010/main" val="0"/>
+                </a:ext>
+              </a:extLst>
+            </a:blip>
+            <a:srcRect l="-1" r="473" b="-80"/>
+            <a:stretch/>
+          </p:blipFill>
+          <p:spPr>
+            <a:xfrm>
+              <a:off x="2514600" y="2377440"/>
+              <a:ext cx="7141464" cy="5084064"/>
+            </a:xfrm>
+            <a:prstGeom prst="rect">
+              <a:avLst/>
+            </a:prstGeom>
+          </p:spPr>
+        </p:pic>
+        <p:pic>
+          <p:nvPicPr>
+            <p:cNvPr id="4" name="Picture 3"/>
+            <p:cNvPicPr>
+              <a:picLocks noChangeAspect="1"/>
+            </p:cNvPicPr>
+            <p:nvPr/>
+          </p:nvPicPr>
+          <p:blipFill rotWithShape="1">
+            <a:blip r:embed="rId3">
+              <a:extLst>
+                <a:ext uri="{28A0092B-C50C-407E-A947-70E740481C1C}">
+                  <a14:useLocalDpi xmlns:a14="http://schemas.microsoft.com/office/drawing/2010/main" val="0"/>
+                </a:ext>
+              </a:extLst>
+            </a:blip>
+            <a:srcRect t="569" b="565"/>
+            <a:stretch/>
+          </p:blipFill>
+          <p:spPr>
+            <a:xfrm>
+              <a:off x="2514600" y="7461504"/>
+              <a:ext cx="7162800" cy="5047488"/>
+            </a:xfrm>
+            <a:prstGeom prst="rect">
+              <a:avLst/>
+            </a:prstGeom>
+          </p:spPr>
+        </p:pic>
+      </p:grpSp>
+    </p:spTree>
+    <p:extLst>
+      <p:ext uri="{BB962C8B-B14F-4D97-AF65-F5344CB8AC3E}">
+        <p14:creationId xmlns:p14="http://schemas.microsoft.com/office/powerpoint/2010/main" val="518332405"/>
+      </p:ext>
+    </p:extLst>
+  </p:cSld>
+  <p:clrMapOvr>
+    <a:masterClrMapping/>
+  </p:clrMapOvr>
+</p:sld>
+</file>
+
+<file path=ppt/slides/slide6.xml><?xml version="1.0" encoding="utf-8"?>
+<p:sld xmlns:a="http://schemas.openxmlformats.org/drawingml/2006/main" xmlns:r="http://schemas.openxmlformats.org/officeDocument/2006/relationships" xmlns:p="http://schemas.openxmlformats.org/presentationml/2006/main">
+  <p:cSld>
+    <p:spTree>
+      <p:nvGrpSpPr>
+        <p:cNvPr id="1" name=""/>
+        <p:cNvGrpSpPr/>
+        <p:nvPr/>
+      </p:nvGrpSpPr>
+      <p:grpSpPr>
+        <a:xfrm>
+          <a:off x="0" y="0"/>
+          <a:ext cx="0" cy="0"/>
+          <a:chOff x="0" y="0"/>
+          <a:chExt cx="0" cy="0"/>
+        </a:xfrm>
+      </p:grpSpPr>
+      <p:grpSp>
+        <p:nvGrpSpPr>
+          <p:cNvPr id="6" name="Group 5"/>
+          <p:cNvGrpSpPr/>
+          <p:nvPr/>
+        </p:nvGrpSpPr>
+        <p:grpSpPr>
+          <a:xfrm>
+            <a:off x="2489200" y="1525524"/>
+            <a:ext cx="7205472" cy="10131552"/>
+            <a:chOff x="2489200" y="1525524"/>
+            <a:chExt cx="7205472" cy="10131552"/>
+          </a:xfrm>
+        </p:grpSpPr>
+        <p:pic>
+          <p:nvPicPr>
+            <p:cNvPr id="4" name="Picture 3"/>
+            <p:cNvPicPr>
+              <a:picLocks noChangeAspect="1"/>
+            </p:cNvPicPr>
+            <p:nvPr/>
+          </p:nvPicPr>
+          <p:blipFill rotWithShape="1">
+            <a:blip r:embed="rId2">
+              <a:extLst>
+                <a:ext uri="{28A0092B-C50C-407E-A947-70E740481C1C}">
+                  <a14:useLocalDpi xmlns:a14="http://schemas.microsoft.com/office/drawing/2010/main" val="0"/>
+                </a:ext>
+              </a:extLst>
+            </a:blip>
+            <a:srcRect l="1" t="-1" r="-64" b="529"/>
+            <a:stretch/>
+          </p:blipFill>
+          <p:spPr>
+            <a:xfrm>
+              <a:off x="2489200" y="6591300"/>
+              <a:ext cx="7205472" cy="5065776"/>
+            </a:xfrm>
+            <a:prstGeom prst="rect">
+              <a:avLst/>
+            </a:prstGeom>
+          </p:spPr>
+        </p:pic>
+        <p:pic>
+          <p:nvPicPr>
+            <p:cNvPr id="5" name="Picture 4"/>
+            <p:cNvPicPr>
+              <a:picLocks noChangeAspect="1"/>
+            </p:cNvPicPr>
+            <p:nvPr/>
+          </p:nvPicPr>
+          <p:blipFill rotWithShape="1">
+            <a:blip r:embed="rId3">
+              <a:extLst>
+                <a:ext uri="{28A0092B-C50C-407E-A947-70E740481C1C}">
+                  <a14:useLocalDpi xmlns:a14="http://schemas.microsoft.com/office/drawing/2010/main" val="0"/>
+                </a:ext>
+              </a:extLst>
+            </a:blip>
+            <a:srcRect l="-28" t="-1" r="28" b="529"/>
+            <a:stretch/>
+          </p:blipFill>
+          <p:spPr>
+            <a:xfrm>
+              <a:off x="2493772" y="1525524"/>
+              <a:ext cx="7200900" cy="5065776"/>
+            </a:xfrm>
+            <a:prstGeom prst="rect">
+              <a:avLst/>
+            </a:prstGeom>
+          </p:spPr>
+        </p:pic>
+      </p:grpSp>
+    </p:spTree>
+    <p:extLst>
+      <p:ext uri="{BB962C8B-B14F-4D97-AF65-F5344CB8AC3E}">
+        <p14:creationId xmlns:p14="http://schemas.microsoft.com/office/powerpoint/2010/main" val="1619591142"/>
+      </p:ext>
+    </p:extLst>
+  </p:cSld>
+  <p:clrMapOvr>
+    <a:masterClrMapping/>
+  </p:clrMapOvr>
+</p:sld>
+</file>
+
+<file path=ppt/slides/slide7.xml><?xml version="1.0" encoding="utf-8"?>
+<p:sld xmlns:a="http://schemas.openxmlformats.org/drawingml/2006/main" xmlns:r="http://schemas.openxmlformats.org/officeDocument/2006/relationships" xmlns:p="http://schemas.openxmlformats.org/presentationml/2006/main">
+  <p:cSld>
+    <p:spTree>
+      <p:nvGrpSpPr>
+        <p:cNvPr id="1" name=""/>
+        <p:cNvGrpSpPr/>
+        <p:nvPr/>
+      </p:nvGrpSpPr>
+      <p:grpSpPr>
+        <a:xfrm>
+          <a:off x="0" y="0"/>
+          <a:ext cx="0" cy="0"/>
+          <a:chOff x="0" y="0"/>
+          <a:chExt cx="0" cy="0"/>
+        </a:xfrm>
+      </p:grpSpPr>
+      <p:grpSp>
+        <p:nvGrpSpPr>
+          <p:cNvPr id="29" name="Group 28"/>
+          <p:cNvGrpSpPr/>
+          <p:nvPr/>
+        </p:nvGrpSpPr>
+        <p:grpSpPr>
+          <a:xfrm>
+            <a:off x="464127" y="1797628"/>
+            <a:ext cx="11050399" cy="12768977"/>
+            <a:chOff x="464127" y="1797628"/>
+            <a:chExt cx="11050399" cy="12768977"/>
+          </a:xfrm>
+        </p:grpSpPr>
+        <p:pic>
+          <p:nvPicPr>
+            <p:cNvPr id="4" name="Picture 3"/>
+            <p:cNvPicPr>
+              <a:picLocks noChangeAspect="1"/>
+            </p:cNvPicPr>
+            <p:nvPr/>
+          </p:nvPicPr>
+          <p:blipFill rotWithShape="1">
+            <a:blip r:embed="rId2">
+              <a:extLst>
+                <a:ext uri="{28A0092B-C50C-407E-A947-70E740481C1C}">
+                  <a14:useLocalDpi xmlns:a14="http://schemas.microsoft.com/office/drawing/2010/main" val="0"/>
+                </a:ext>
+              </a:extLst>
+            </a:blip>
+            <a:srcRect r="31573"/>
+            <a:stretch/>
+          </p:blipFill>
+          <p:spPr>
+            <a:xfrm>
+              <a:off x="4121727" y="1809506"/>
+              <a:ext cx="3657600" cy="3831856"/>
+            </a:xfrm>
+            <a:prstGeom prst="rect">
+              <a:avLst/>
+            </a:prstGeom>
+          </p:spPr>
+        </p:pic>
+        <p:pic>
+          <p:nvPicPr>
+            <p:cNvPr id="5" name="Picture 4"/>
+            <p:cNvPicPr>
+              <a:picLocks noChangeAspect="1"/>
+            </p:cNvPicPr>
+            <p:nvPr/>
+          </p:nvPicPr>
+          <p:blipFill rotWithShape="1">
+            <a:blip r:embed="rId3">
+              <a:extLst>
+                <a:ext uri="{28A0092B-C50C-407E-A947-70E740481C1C}">
+                  <a14:useLocalDpi xmlns:a14="http://schemas.microsoft.com/office/drawing/2010/main" val="0"/>
+                </a:ext>
+              </a:extLst>
+            </a:blip>
+            <a:srcRect r="31573"/>
+            <a:stretch/>
+          </p:blipFill>
+          <p:spPr>
+            <a:xfrm>
+              <a:off x="7779327" y="1809506"/>
+              <a:ext cx="3657600" cy="3831856"/>
+            </a:xfrm>
+            <a:prstGeom prst="rect">
+              <a:avLst/>
+            </a:prstGeom>
+          </p:spPr>
+        </p:pic>
+        <p:pic>
+          <p:nvPicPr>
+            <p:cNvPr id="6" name="Picture 5"/>
+            <p:cNvPicPr>
+              <a:picLocks noChangeAspect="1"/>
+            </p:cNvPicPr>
+            <p:nvPr/>
+          </p:nvPicPr>
+          <p:blipFill rotWithShape="1">
+            <a:blip r:embed="rId4">
+              <a:extLst>
+                <a:ext uri="{28A0092B-C50C-407E-A947-70E740481C1C}">
+                  <a14:useLocalDpi xmlns:a14="http://schemas.microsoft.com/office/drawing/2010/main" val="0"/>
+                </a:ext>
+              </a:extLst>
+            </a:blip>
+            <a:srcRect l="1" r="31784"/>
+            <a:stretch/>
+          </p:blipFill>
+          <p:spPr>
+            <a:xfrm>
+              <a:off x="464127" y="1797628"/>
+              <a:ext cx="3657600" cy="3843734"/>
+            </a:xfrm>
+            <a:prstGeom prst="rect">
+              <a:avLst/>
+            </a:prstGeom>
+          </p:spPr>
+        </p:pic>
+        <p:pic>
+          <p:nvPicPr>
+            <p:cNvPr id="7" name="Picture 6"/>
+            <p:cNvPicPr>
+              <a:picLocks noChangeAspect="1"/>
+            </p:cNvPicPr>
+            <p:nvPr/>
+          </p:nvPicPr>
+          <p:blipFill rotWithShape="1">
+            <a:blip r:embed="rId5">
+              <a:extLst>
+                <a:ext uri="{28A0092B-C50C-407E-A947-70E740481C1C}">
+                  <a14:useLocalDpi xmlns:a14="http://schemas.microsoft.com/office/drawing/2010/main" val="0"/>
+                </a:ext>
+              </a:extLst>
+            </a:blip>
+            <a:srcRect l="-1" r="31359"/>
+            <a:stretch/>
+          </p:blipFill>
+          <p:spPr>
+            <a:xfrm>
+              <a:off x="464127" y="5653240"/>
+              <a:ext cx="3749040" cy="3915303"/>
+            </a:xfrm>
+            <a:prstGeom prst="rect">
+              <a:avLst/>
+            </a:prstGeom>
+          </p:spPr>
+        </p:pic>
+        <p:pic>
+          <p:nvPicPr>
+            <p:cNvPr id="8" name="Picture 7"/>
+            <p:cNvPicPr>
+              <a:picLocks noChangeAspect="1"/>
+            </p:cNvPicPr>
+            <p:nvPr/>
+          </p:nvPicPr>
+          <p:blipFill rotWithShape="1">
+            <a:blip r:embed="rId6">
+              <a:extLst>
+                <a:ext uri="{28A0092B-C50C-407E-A947-70E740481C1C}">
+                  <a14:useLocalDpi xmlns:a14="http://schemas.microsoft.com/office/drawing/2010/main" val="0"/>
+                </a:ext>
+              </a:extLst>
+            </a:blip>
+            <a:srcRect l="1" r="31610"/>
+            <a:stretch/>
+          </p:blipFill>
+          <p:spPr>
+            <a:xfrm>
+              <a:off x="7779327" y="5653240"/>
+              <a:ext cx="3735199" cy="3915303"/>
+            </a:xfrm>
+            <a:prstGeom prst="rect">
+              <a:avLst/>
+            </a:prstGeom>
+          </p:spPr>
+        </p:pic>
+        <p:pic>
+          <p:nvPicPr>
+            <p:cNvPr id="9" name="Picture 8"/>
+            <p:cNvPicPr>
+              <a:picLocks noChangeAspect="1"/>
+            </p:cNvPicPr>
+            <p:nvPr/>
+          </p:nvPicPr>
+          <p:blipFill rotWithShape="1">
+            <a:blip r:embed="rId7">
+              <a:extLst>
+                <a:ext uri="{28A0092B-C50C-407E-A947-70E740481C1C}">
+                  <a14:useLocalDpi xmlns:a14="http://schemas.microsoft.com/office/drawing/2010/main" val="0"/>
+                </a:ext>
+              </a:extLst>
+            </a:blip>
+            <a:srcRect l="1" r="31610"/>
+            <a:stretch/>
+          </p:blipFill>
+          <p:spPr>
+            <a:xfrm>
+              <a:off x="4121727" y="5641362"/>
+              <a:ext cx="3746531" cy="3927181"/>
+            </a:xfrm>
+            <a:prstGeom prst="rect">
+              <a:avLst/>
+            </a:prstGeom>
+          </p:spPr>
+        </p:pic>
+        <p:pic>
+          <p:nvPicPr>
+            <p:cNvPr id="10" name="Picture 9"/>
+            <p:cNvPicPr>
+              <a:picLocks noChangeAspect="1"/>
+            </p:cNvPicPr>
+            <p:nvPr/>
+          </p:nvPicPr>
+          <p:blipFill rotWithShape="1">
+            <a:blip r:embed="rId8">
+              <a:extLst>
+                <a:ext uri="{28A0092B-C50C-407E-A947-70E740481C1C}">
+                  <a14:useLocalDpi xmlns:a14="http://schemas.microsoft.com/office/drawing/2010/main" val="0"/>
+                </a:ext>
+              </a:extLst>
+            </a:blip>
+            <a:srcRect l="1" r="31610"/>
+            <a:stretch/>
+          </p:blipFill>
+          <p:spPr>
+            <a:xfrm>
+              <a:off x="464127" y="9580421"/>
+              <a:ext cx="3745951" cy="3926573"/>
+            </a:xfrm>
+            <a:prstGeom prst="rect">
+              <a:avLst/>
+            </a:prstGeom>
+          </p:spPr>
+        </p:pic>
+        <p:pic>
+          <p:nvPicPr>
+            <p:cNvPr id="11" name="Picture 10"/>
+            <p:cNvPicPr>
+              <a:picLocks noChangeAspect="1"/>
+            </p:cNvPicPr>
+            <p:nvPr/>
+          </p:nvPicPr>
+          <p:blipFill rotWithShape="1">
+            <a:blip r:embed="rId9">
+              <a:extLst>
+                <a:ext uri="{28A0092B-C50C-407E-A947-70E740481C1C}">
+                  <a14:useLocalDpi xmlns:a14="http://schemas.microsoft.com/office/drawing/2010/main" val="0"/>
+                </a:ext>
+              </a:extLst>
+            </a:blip>
+            <a:srcRect l="1" r="31610"/>
+            <a:stretch/>
+          </p:blipFill>
+          <p:spPr>
+            <a:xfrm>
+              <a:off x="7867678" y="9580420"/>
+              <a:ext cx="3644260" cy="3926573"/>
+            </a:xfrm>
+            <a:prstGeom prst="rect">
+              <a:avLst/>
+            </a:prstGeom>
+          </p:spPr>
+        </p:pic>
+        <p:pic>
+          <p:nvPicPr>
+            <p:cNvPr id="12" name="Picture 11"/>
+            <p:cNvPicPr>
+              <a:picLocks noChangeAspect="1"/>
+            </p:cNvPicPr>
+            <p:nvPr/>
+          </p:nvPicPr>
+          <p:blipFill rotWithShape="1">
+            <a:blip r:embed="rId10">
+              <a:extLst>
+                <a:ext uri="{28A0092B-C50C-407E-A947-70E740481C1C}">
+                  <a14:useLocalDpi xmlns:a14="http://schemas.microsoft.com/office/drawing/2010/main" val="0"/>
+                </a:ext>
+              </a:extLst>
+            </a:blip>
+            <a:srcRect l="1" r="31610"/>
+            <a:stretch/>
+          </p:blipFill>
+          <p:spPr>
+            <a:xfrm>
+              <a:off x="4121727" y="9580421"/>
+              <a:ext cx="3745951" cy="3926573"/>
+            </a:xfrm>
+            <a:prstGeom prst="rect">
+              <a:avLst/>
+            </a:prstGeom>
+          </p:spPr>
+        </p:pic>
+        <p:grpSp>
+          <p:nvGrpSpPr>
+            <p:cNvPr id="28" name="Group 27"/>
+            <p:cNvGrpSpPr/>
+            <p:nvPr/>
+          </p:nvGrpSpPr>
+          <p:grpSpPr>
+            <a:xfrm>
+              <a:off x="2795603" y="13754180"/>
+              <a:ext cx="7302319" cy="812425"/>
+              <a:chOff x="881743" y="14115686"/>
+              <a:chExt cx="8765183" cy="975177"/>
+            </a:xfrm>
+          </p:grpSpPr>
+          <p:pic>
+            <p:nvPicPr>
+              <p:cNvPr id="13" name="Picture 12"/>
+              <p:cNvPicPr>
+                <a:picLocks noChangeAspect="1"/>
+              </p:cNvPicPr>
+              <p:nvPr/>
+            </p:nvPicPr>
+            <p:blipFill rotWithShape="1">
+              <a:blip r:embed="rId2">
+                <a:extLst>
+                  <a:ext uri="{28A0092B-C50C-407E-A947-70E740481C1C}">
+                    <a14:useLocalDpi xmlns:a14="http://schemas.microsoft.com/office/drawing/2010/main" val="0"/>
+                  </a:ext>
+                </a:extLst>
+              </a:blip>
+              <a:srcRect l="68126" b="93071"/>
+              <a:stretch/>
+            </p:blipFill>
+            <p:spPr>
+              <a:xfrm>
+                <a:off x="881743" y="14278429"/>
+                <a:ext cx="2258786" cy="351971"/>
+              </a:xfrm>
+              <a:prstGeom prst="rect">
+                <a:avLst/>
+              </a:prstGeom>
+            </p:spPr>
+          </p:pic>
+          <p:pic>
+            <p:nvPicPr>
+              <p:cNvPr id="14" name="Picture 13"/>
+              <p:cNvPicPr>
+                <a:picLocks noChangeAspect="1"/>
+              </p:cNvPicPr>
+              <p:nvPr/>
+            </p:nvPicPr>
+            <p:blipFill rotWithShape="1">
+              <a:blip r:embed="rId2">
+                <a:extLst>
+                  <a:ext uri="{28A0092B-C50C-407E-A947-70E740481C1C}">
+                    <a14:useLocalDpi xmlns:a14="http://schemas.microsoft.com/office/drawing/2010/main" val="0"/>
+                  </a:ext>
+                </a:extLst>
+              </a:blip>
+              <a:srcRect l="68126" t="12715" b="78928"/>
+              <a:stretch/>
+            </p:blipFill>
+            <p:spPr>
+              <a:xfrm>
+                <a:off x="2992334" y="14189527"/>
+                <a:ext cx="2258786" cy="424543"/>
+              </a:xfrm>
+              <a:prstGeom prst="rect">
+                <a:avLst/>
+              </a:prstGeom>
+            </p:spPr>
+          </p:pic>
+          <p:pic>
+            <p:nvPicPr>
+              <p:cNvPr id="15" name="Picture 14"/>
+              <p:cNvPicPr>
+                <a:picLocks noChangeAspect="1"/>
+              </p:cNvPicPr>
+              <p:nvPr/>
+            </p:nvPicPr>
+            <p:blipFill rotWithShape="1">
+              <a:blip r:embed="rId2">
+                <a:extLst>
+                  <a:ext uri="{28A0092B-C50C-407E-A947-70E740481C1C}">
+                    <a14:useLocalDpi xmlns:a14="http://schemas.microsoft.com/office/drawing/2010/main" val="0"/>
+                  </a:ext>
+                </a:extLst>
+              </a:blip>
+              <a:srcRect l="68127" t="22103" r="-1" b="68898"/>
+              <a:stretch/>
+            </p:blipFill>
+            <p:spPr>
+              <a:xfrm>
+                <a:off x="5102925" y="14173199"/>
+                <a:ext cx="2258786" cy="457201"/>
+              </a:xfrm>
+              <a:prstGeom prst="rect">
+                <a:avLst/>
+              </a:prstGeom>
+            </p:spPr>
+          </p:pic>
+          <p:pic>
+            <p:nvPicPr>
+              <p:cNvPr id="16" name="Picture 15"/>
+              <p:cNvPicPr>
+                <a:picLocks noChangeAspect="1"/>
+              </p:cNvPicPr>
+              <p:nvPr/>
+            </p:nvPicPr>
+            <p:blipFill rotWithShape="1">
+              <a:blip r:embed="rId2">
+                <a:extLst>
+                  <a:ext uri="{28A0092B-C50C-407E-A947-70E740481C1C}">
+                    <a14:useLocalDpi xmlns:a14="http://schemas.microsoft.com/office/drawing/2010/main" val="0"/>
+                  </a:ext>
+                </a:extLst>
+              </a:blip>
+              <a:srcRect l="68127" t="61029" r="-1" b="30364"/>
+              <a:stretch/>
+            </p:blipFill>
+            <p:spPr>
+              <a:xfrm>
+                <a:off x="7388140" y="14630400"/>
+                <a:ext cx="2258786" cy="420911"/>
+              </a:xfrm>
+              <a:prstGeom prst="rect">
+                <a:avLst/>
+              </a:prstGeom>
+            </p:spPr>
+          </p:pic>
+          <p:pic>
+            <p:nvPicPr>
+              <p:cNvPr id="17" name="Picture 16"/>
+              <p:cNvPicPr>
+                <a:picLocks noChangeAspect="1"/>
+              </p:cNvPicPr>
+              <p:nvPr/>
+            </p:nvPicPr>
+            <p:blipFill rotWithShape="1">
+              <a:blip r:embed="rId2">
+                <a:extLst>
+                  <a:ext uri="{28A0092B-C50C-407E-A947-70E740481C1C}">
+                    <a14:useLocalDpi xmlns:a14="http://schemas.microsoft.com/office/drawing/2010/main" val="0"/>
+                  </a:ext>
+                </a:extLst>
+              </a:blip>
+              <a:srcRect l="68126" t="30786" b="59571"/>
+              <a:stretch/>
+            </p:blipFill>
+            <p:spPr>
+              <a:xfrm>
+                <a:off x="7388140" y="14115686"/>
+                <a:ext cx="2258786" cy="489857"/>
+              </a:xfrm>
+              <a:prstGeom prst="rect">
+                <a:avLst/>
+              </a:prstGeom>
+            </p:spPr>
+          </p:pic>
+          <p:pic>
+            <p:nvPicPr>
+              <p:cNvPr id="18" name="Picture 17"/>
+              <p:cNvPicPr>
+                <a:picLocks noChangeAspect="1"/>
+              </p:cNvPicPr>
+              <p:nvPr/>
+            </p:nvPicPr>
+            <p:blipFill rotWithShape="1">
+              <a:blip r:embed="rId2">
+                <a:extLst>
+                  <a:ext uri="{28A0092B-C50C-407E-A947-70E740481C1C}">
+                    <a14:useLocalDpi xmlns:a14="http://schemas.microsoft.com/office/drawing/2010/main" val="0"/>
+                  </a:ext>
+                </a:extLst>
+              </a:blip>
+              <a:srcRect l="68126" t="40429" b="49286"/>
+              <a:stretch/>
+            </p:blipFill>
+            <p:spPr>
+              <a:xfrm>
+                <a:off x="2992334" y="14568349"/>
+                <a:ext cx="2258786" cy="522514"/>
+              </a:xfrm>
+              <a:prstGeom prst="rect">
+                <a:avLst/>
+              </a:prstGeom>
+            </p:spPr>
+          </p:pic>
+          <p:pic>
+            <p:nvPicPr>
+              <p:cNvPr id="19" name="Picture 18"/>
+              <p:cNvPicPr>
+                <a:picLocks noChangeAspect="1"/>
+              </p:cNvPicPr>
+              <p:nvPr/>
+            </p:nvPicPr>
+            <p:blipFill rotWithShape="1">
+              <a:blip r:embed="rId2">
+                <a:extLst>
+                  <a:ext uri="{28A0092B-C50C-407E-A947-70E740481C1C}">
+                    <a14:useLocalDpi xmlns:a14="http://schemas.microsoft.com/office/drawing/2010/main" val="0"/>
+                  </a:ext>
+                </a:extLst>
+              </a:blip>
+              <a:srcRect l="68126" t="49428" b="39643"/>
+              <a:stretch/>
+            </p:blipFill>
+            <p:spPr>
+              <a:xfrm>
+                <a:off x="5102925" y="14520994"/>
+                <a:ext cx="2258786" cy="555174"/>
+              </a:xfrm>
+              <a:prstGeom prst="rect">
+                <a:avLst/>
+              </a:prstGeom>
+            </p:spPr>
+          </p:pic>
+        </p:grpSp>
+      </p:grpSp>
+    </p:spTree>
+    <p:extLst>
+      <p:ext uri="{BB962C8B-B14F-4D97-AF65-F5344CB8AC3E}">
+        <p14:creationId xmlns:p14="http://schemas.microsoft.com/office/powerpoint/2010/main" val="88726999"/>
+      </p:ext>
+    </p:extLst>
+  </p:cSld>
+  <p:clrMapOvr>
+    <a:masterClrMapping/>
+  </p:clrMapOvr>
+</p:sld>
+</file>
+
+<file path=ppt/slides/slide8.xml><?xml version="1.0" encoding="utf-8"?>
+<p:sld xmlns:a="http://schemas.openxmlformats.org/drawingml/2006/main" xmlns:r="http://schemas.openxmlformats.org/officeDocument/2006/relationships" xmlns:p="http://schemas.openxmlformats.org/presentationml/2006/main">
+  <p:cSld>
+    <p:spTree>
+      <p:nvGrpSpPr>
+        <p:cNvPr id="1" name=""/>
+        <p:cNvGrpSpPr/>
+        <p:nvPr/>
+      </p:nvGrpSpPr>
+      <p:grpSpPr>
+        <a:xfrm>
+          <a:off x="0" y="0"/>
+          <a:ext cx="0" cy="0"/>
+          <a:chOff x="0" y="0"/>
+          <a:chExt cx="0" cy="0"/>
+        </a:xfrm>
+      </p:grpSpPr>
+      <p:grpSp>
+        <p:nvGrpSpPr>
+          <p:cNvPr id="22" name="Group 21"/>
+          <p:cNvGrpSpPr/>
+          <p:nvPr/>
+        </p:nvGrpSpPr>
+        <p:grpSpPr>
+          <a:xfrm>
+            <a:off x="760710" y="395632"/>
+            <a:ext cx="10977119" cy="12403133"/>
+            <a:chOff x="760710" y="395632"/>
+            <a:chExt cx="10977119" cy="12403133"/>
+          </a:xfrm>
+        </p:grpSpPr>
+        <p:pic>
+          <p:nvPicPr>
+            <p:cNvPr id="4" name="Picture 3"/>
+            <p:cNvPicPr>
+              <a:picLocks noChangeAspect="1"/>
+            </p:cNvPicPr>
+            <p:nvPr/>
+          </p:nvPicPr>
+          <p:blipFill rotWithShape="1">
+            <a:blip r:embed="rId2">
+              <a:extLst>
+                <a:ext uri="{28A0092B-C50C-407E-A947-70E740481C1C}">
+                  <a14:useLocalDpi xmlns:a14="http://schemas.microsoft.com/office/drawing/2010/main" val="0"/>
+                </a:ext>
+              </a:extLst>
+            </a:blip>
+            <a:srcRect l="-4" r="30575"/>
+            <a:stretch/>
+          </p:blipFill>
+          <p:spPr>
+            <a:xfrm>
+              <a:off x="8075911" y="395632"/>
+              <a:ext cx="3661918" cy="3767406"/>
+            </a:xfrm>
+            <a:prstGeom prst="rect">
+              <a:avLst/>
+            </a:prstGeom>
+          </p:spPr>
+        </p:pic>
+        <p:pic>
+          <p:nvPicPr>
+            <p:cNvPr id="5" name="Picture 4"/>
+            <p:cNvPicPr>
+              <a:picLocks noChangeAspect="1"/>
+            </p:cNvPicPr>
+            <p:nvPr/>
+          </p:nvPicPr>
+          <p:blipFill rotWithShape="1">
+            <a:blip r:embed="rId3">
+              <a:extLst>
+                <a:ext uri="{28A0092B-C50C-407E-A947-70E740481C1C}">
+                  <a14:useLocalDpi xmlns:a14="http://schemas.microsoft.com/office/drawing/2010/main" val="0"/>
+                </a:ext>
+              </a:extLst>
+            </a:blip>
+            <a:srcRect l="-4" r="30575"/>
+            <a:stretch/>
+          </p:blipFill>
+          <p:spPr>
+            <a:xfrm>
+              <a:off x="4418310" y="395632"/>
+              <a:ext cx="3661918" cy="3767405"/>
+            </a:xfrm>
+            <a:prstGeom prst="rect">
+              <a:avLst/>
+            </a:prstGeom>
+          </p:spPr>
+        </p:pic>
+        <p:pic>
+          <p:nvPicPr>
+            <p:cNvPr id="6" name="Picture 5"/>
+            <p:cNvPicPr>
+              <a:picLocks noChangeAspect="1"/>
+            </p:cNvPicPr>
+            <p:nvPr/>
+          </p:nvPicPr>
+          <p:blipFill rotWithShape="1">
+            <a:blip r:embed="rId4">
+              <a:extLst>
+                <a:ext uri="{28A0092B-C50C-407E-A947-70E740481C1C}">
+                  <a14:useLocalDpi xmlns:a14="http://schemas.microsoft.com/office/drawing/2010/main" val="0"/>
+                </a:ext>
+              </a:extLst>
+            </a:blip>
+            <a:srcRect l="-4" r="30575"/>
+            <a:stretch/>
+          </p:blipFill>
+          <p:spPr>
+            <a:xfrm>
+              <a:off x="760710" y="400076"/>
+              <a:ext cx="3657600" cy="3762962"/>
+            </a:xfrm>
+            <a:prstGeom prst="rect">
+              <a:avLst/>
+            </a:prstGeom>
+          </p:spPr>
+        </p:pic>
+        <p:pic>
+          <p:nvPicPr>
+            <p:cNvPr id="8" name="Picture 7"/>
+            <p:cNvPicPr>
+              <a:picLocks noChangeAspect="1"/>
+            </p:cNvPicPr>
+            <p:nvPr/>
+          </p:nvPicPr>
+          <p:blipFill rotWithShape="1">
+            <a:blip r:embed="rId5">
+              <a:extLst>
+                <a:ext uri="{28A0092B-C50C-407E-A947-70E740481C1C}">
+                  <a14:useLocalDpi xmlns:a14="http://schemas.microsoft.com/office/drawing/2010/main" val="0"/>
+                </a:ext>
+              </a:extLst>
+            </a:blip>
+            <a:srcRect l="-4" r="30575"/>
+            <a:stretch/>
+          </p:blipFill>
+          <p:spPr>
+            <a:xfrm>
+              <a:off x="8075910" y="4163036"/>
+              <a:ext cx="3661917" cy="3767405"/>
+            </a:xfrm>
+            <a:prstGeom prst="rect">
+              <a:avLst/>
+            </a:prstGeom>
+          </p:spPr>
+        </p:pic>
+        <p:pic>
+          <p:nvPicPr>
+            <p:cNvPr id="9" name="Picture 8"/>
+            <p:cNvPicPr>
+              <a:picLocks noChangeAspect="1"/>
+            </p:cNvPicPr>
+            <p:nvPr/>
+          </p:nvPicPr>
+          <p:blipFill rotWithShape="1">
+            <a:blip r:embed="rId6">
+              <a:extLst>
+                <a:ext uri="{28A0092B-C50C-407E-A947-70E740481C1C}">
+                  <a14:useLocalDpi xmlns:a14="http://schemas.microsoft.com/office/drawing/2010/main" val="0"/>
+                </a:ext>
+              </a:extLst>
+            </a:blip>
+            <a:srcRect l="-4" r="30575"/>
+            <a:stretch/>
+          </p:blipFill>
+          <p:spPr>
+            <a:xfrm>
+              <a:off x="4446771" y="4163036"/>
+              <a:ext cx="3661918" cy="3767405"/>
+            </a:xfrm>
+            <a:prstGeom prst="rect">
+              <a:avLst/>
+            </a:prstGeom>
+          </p:spPr>
+        </p:pic>
+        <p:pic>
+          <p:nvPicPr>
+            <p:cNvPr id="10" name="Picture 9"/>
+            <p:cNvPicPr>
+              <a:picLocks noChangeAspect="1"/>
+            </p:cNvPicPr>
+            <p:nvPr/>
+          </p:nvPicPr>
+          <p:blipFill rotWithShape="1">
+            <a:blip r:embed="rId7">
+              <a:extLst>
+                <a:ext uri="{28A0092B-C50C-407E-A947-70E740481C1C}">
+                  <a14:useLocalDpi xmlns:a14="http://schemas.microsoft.com/office/drawing/2010/main" val="0"/>
+                </a:ext>
+              </a:extLst>
+            </a:blip>
+            <a:srcRect l="-4" r="30575"/>
+            <a:stretch/>
+          </p:blipFill>
+          <p:spPr>
+            <a:xfrm>
+              <a:off x="760710" y="4163037"/>
+              <a:ext cx="3686060" cy="3792243"/>
+            </a:xfrm>
+            <a:prstGeom prst="rect">
+              <a:avLst/>
+            </a:prstGeom>
+          </p:spPr>
+        </p:pic>
+        <p:pic>
+          <p:nvPicPr>
+            <p:cNvPr id="11" name="Picture 10"/>
+            <p:cNvPicPr>
+              <a:picLocks noChangeAspect="1"/>
+            </p:cNvPicPr>
+            <p:nvPr/>
+          </p:nvPicPr>
+          <p:blipFill rotWithShape="1">
+            <a:blip r:embed="rId8">
+              <a:extLst>
+                <a:ext uri="{28A0092B-C50C-407E-A947-70E740481C1C}">
+                  <a14:useLocalDpi xmlns:a14="http://schemas.microsoft.com/office/drawing/2010/main" val="0"/>
+                </a:ext>
+              </a:extLst>
+            </a:blip>
+            <a:srcRect l="-4" r="30575"/>
+            <a:stretch/>
+          </p:blipFill>
+          <p:spPr>
+            <a:xfrm>
+              <a:off x="760710" y="7955280"/>
+              <a:ext cx="3661918" cy="3767405"/>
+            </a:xfrm>
+            <a:prstGeom prst="rect">
+              <a:avLst/>
+            </a:prstGeom>
+          </p:spPr>
+        </p:pic>
+        <p:pic>
+          <p:nvPicPr>
+            <p:cNvPr id="12" name="Picture 11"/>
+            <p:cNvPicPr>
+              <a:picLocks noChangeAspect="1"/>
+            </p:cNvPicPr>
+            <p:nvPr/>
+          </p:nvPicPr>
+          <p:blipFill rotWithShape="1">
+            <a:blip r:embed="rId9">
+              <a:extLst>
+                <a:ext uri="{28A0092B-C50C-407E-A947-70E740481C1C}">
+                  <a14:useLocalDpi xmlns:a14="http://schemas.microsoft.com/office/drawing/2010/main" val="0"/>
+                </a:ext>
+              </a:extLst>
+            </a:blip>
+            <a:srcRect l="-4" r="30575"/>
+            <a:stretch/>
+          </p:blipFill>
+          <p:spPr>
+            <a:xfrm>
+              <a:off x="4446770" y="7955280"/>
+              <a:ext cx="3661919" cy="3767406"/>
+            </a:xfrm>
+            <a:prstGeom prst="rect">
+              <a:avLst/>
+            </a:prstGeom>
+          </p:spPr>
+        </p:pic>
+        <p:pic>
+          <p:nvPicPr>
+            <p:cNvPr id="13" name="Picture 12"/>
+            <p:cNvPicPr>
+              <a:picLocks noChangeAspect="1"/>
+            </p:cNvPicPr>
+            <p:nvPr/>
+          </p:nvPicPr>
+          <p:blipFill rotWithShape="1">
+            <a:blip r:embed="rId10">
+              <a:extLst>
+                <a:ext uri="{28A0092B-C50C-407E-A947-70E740481C1C}">
+                  <a14:useLocalDpi xmlns:a14="http://schemas.microsoft.com/office/drawing/2010/main" val="0"/>
+                </a:ext>
+              </a:extLst>
+            </a:blip>
+            <a:srcRect l="-4" r="30575"/>
+            <a:stretch/>
+          </p:blipFill>
+          <p:spPr>
+            <a:xfrm>
+              <a:off x="8075910" y="7955280"/>
+              <a:ext cx="3661918" cy="3767405"/>
+            </a:xfrm>
+            <a:prstGeom prst="rect">
+              <a:avLst/>
+            </a:prstGeom>
+          </p:spPr>
+        </p:pic>
+        <p:grpSp>
+          <p:nvGrpSpPr>
+            <p:cNvPr id="14" name="Group 13"/>
+            <p:cNvGrpSpPr/>
+            <p:nvPr/>
+          </p:nvGrpSpPr>
+          <p:grpSpPr>
+            <a:xfrm>
+              <a:off x="2948003" y="11986340"/>
+              <a:ext cx="7302319" cy="812425"/>
+              <a:chOff x="881743" y="14115686"/>
+              <a:chExt cx="8765183" cy="975177"/>
+            </a:xfrm>
+          </p:grpSpPr>
+          <p:pic>
+            <p:nvPicPr>
+              <p:cNvPr id="15" name="Picture 14"/>
+              <p:cNvPicPr>
+                <a:picLocks noChangeAspect="1"/>
+              </p:cNvPicPr>
+              <p:nvPr/>
+            </p:nvPicPr>
+            <p:blipFill rotWithShape="1">
+              <a:blip r:embed="rId11">
+                <a:extLst>
+                  <a:ext uri="{28A0092B-C50C-407E-A947-70E740481C1C}">
+                    <a14:useLocalDpi xmlns:a14="http://schemas.microsoft.com/office/drawing/2010/main" val="0"/>
+                  </a:ext>
+                </a:extLst>
+              </a:blip>
+              <a:srcRect l="68126" b="93071"/>
+              <a:stretch/>
+            </p:blipFill>
+            <p:spPr>
+              <a:xfrm>
+                <a:off x="881743" y="14278429"/>
+                <a:ext cx="2258786" cy="351971"/>
+              </a:xfrm>
+              <a:prstGeom prst="rect">
+                <a:avLst/>
+              </a:prstGeom>
+            </p:spPr>
+          </p:pic>
+          <p:pic>
+            <p:nvPicPr>
+              <p:cNvPr id="16" name="Picture 15"/>
+              <p:cNvPicPr>
+                <a:picLocks noChangeAspect="1"/>
+              </p:cNvPicPr>
+              <p:nvPr/>
+            </p:nvPicPr>
+            <p:blipFill rotWithShape="1">
+              <a:blip r:embed="rId11">
+                <a:extLst>
+                  <a:ext uri="{28A0092B-C50C-407E-A947-70E740481C1C}">
+                    <a14:useLocalDpi xmlns:a14="http://schemas.microsoft.com/office/drawing/2010/main" val="0"/>
+                  </a:ext>
+                </a:extLst>
+              </a:blip>
+              <a:srcRect l="68126" t="12715" b="78928"/>
+              <a:stretch/>
+            </p:blipFill>
+            <p:spPr>
+              <a:xfrm>
+                <a:off x="2992334" y="14189527"/>
+                <a:ext cx="2258786" cy="424543"/>
+              </a:xfrm>
+              <a:prstGeom prst="rect">
+                <a:avLst/>
+              </a:prstGeom>
+            </p:spPr>
+          </p:pic>
+          <p:pic>
+            <p:nvPicPr>
+              <p:cNvPr id="17" name="Picture 16"/>
+              <p:cNvPicPr>
+                <a:picLocks noChangeAspect="1"/>
+              </p:cNvPicPr>
+              <p:nvPr/>
+            </p:nvPicPr>
+            <p:blipFill rotWithShape="1">
+              <a:blip r:embed="rId11">
+                <a:extLst>
+                  <a:ext uri="{28A0092B-C50C-407E-A947-70E740481C1C}">
+                    <a14:useLocalDpi xmlns:a14="http://schemas.microsoft.com/office/drawing/2010/main" val="0"/>
+                  </a:ext>
+                </a:extLst>
+              </a:blip>
+              <a:srcRect l="68127" t="22103" r="-1" b="68898"/>
+              <a:stretch/>
+            </p:blipFill>
+            <p:spPr>
+              <a:xfrm>
+                <a:off x="5102925" y="14173199"/>
+                <a:ext cx="2258786" cy="457201"/>
+              </a:xfrm>
+              <a:prstGeom prst="rect">
+                <a:avLst/>
+              </a:prstGeom>
+            </p:spPr>
+          </p:pic>
+          <p:pic>
+            <p:nvPicPr>
+              <p:cNvPr id="18" name="Picture 17"/>
+              <p:cNvPicPr>
+                <a:picLocks noChangeAspect="1"/>
+              </p:cNvPicPr>
+              <p:nvPr/>
+            </p:nvPicPr>
+            <p:blipFill rotWithShape="1">
+              <a:blip r:embed="rId11">
+                <a:extLst>
+                  <a:ext uri="{28A0092B-C50C-407E-A947-70E740481C1C}">
+                    <a14:useLocalDpi xmlns:a14="http://schemas.microsoft.com/office/drawing/2010/main" val="0"/>
+                  </a:ext>
+                </a:extLst>
+              </a:blip>
+              <a:srcRect l="68127" t="61029" r="-1" b="30364"/>
+              <a:stretch/>
+            </p:blipFill>
+            <p:spPr>
+              <a:xfrm>
+                <a:off x="7388140" y="14630400"/>
+                <a:ext cx="2258786" cy="420911"/>
+              </a:xfrm>
+              <a:prstGeom prst="rect">
+                <a:avLst/>
+              </a:prstGeom>
+            </p:spPr>
+          </p:pic>
+          <p:pic>
+            <p:nvPicPr>
+              <p:cNvPr id="19" name="Picture 18"/>
+              <p:cNvPicPr>
+                <a:picLocks noChangeAspect="1"/>
+              </p:cNvPicPr>
+              <p:nvPr/>
+            </p:nvPicPr>
+            <p:blipFill rotWithShape="1">
+              <a:blip r:embed="rId11">
+                <a:extLst>
+                  <a:ext uri="{28A0092B-C50C-407E-A947-70E740481C1C}">
+                    <a14:useLocalDpi xmlns:a14="http://schemas.microsoft.com/office/drawing/2010/main" val="0"/>
+                  </a:ext>
+                </a:extLst>
+              </a:blip>
+              <a:srcRect l="68126" t="30786" b="59571"/>
+              <a:stretch/>
+            </p:blipFill>
+            <p:spPr>
+              <a:xfrm>
+                <a:off x="7388140" y="14115686"/>
+                <a:ext cx="2258786" cy="489857"/>
+              </a:xfrm>
+              <a:prstGeom prst="rect">
+                <a:avLst/>
+              </a:prstGeom>
+            </p:spPr>
+          </p:pic>
+          <p:pic>
+            <p:nvPicPr>
+              <p:cNvPr id="20" name="Picture 19"/>
+              <p:cNvPicPr>
+                <a:picLocks noChangeAspect="1"/>
+              </p:cNvPicPr>
+              <p:nvPr/>
+            </p:nvPicPr>
+            <p:blipFill rotWithShape="1">
+              <a:blip r:embed="rId11">
+                <a:extLst>
+                  <a:ext uri="{28A0092B-C50C-407E-A947-70E740481C1C}">
+                    <a14:useLocalDpi xmlns:a14="http://schemas.microsoft.com/office/drawing/2010/main" val="0"/>
+                  </a:ext>
+                </a:extLst>
+              </a:blip>
+              <a:srcRect l="68126" t="40429" b="49286"/>
+              <a:stretch/>
+            </p:blipFill>
+            <p:spPr>
+              <a:xfrm>
+                <a:off x="2992334" y="14568349"/>
+                <a:ext cx="2258786" cy="522514"/>
+              </a:xfrm>
+              <a:prstGeom prst="rect">
+                <a:avLst/>
+              </a:prstGeom>
+            </p:spPr>
+          </p:pic>
+          <p:pic>
+            <p:nvPicPr>
+              <p:cNvPr id="21" name="Picture 20"/>
+              <p:cNvPicPr>
+                <a:picLocks noChangeAspect="1"/>
+              </p:cNvPicPr>
+              <p:nvPr/>
+            </p:nvPicPr>
+            <p:blipFill rotWithShape="1">
+              <a:blip r:embed="rId11">
+                <a:extLst>
+                  <a:ext uri="{28A0092B-C50C-407E-A947-70E740481C1C}">
+                    <a14:useLocalDpi xmlns:a14="http://schemas.microsoft.com/office/drawing/2010/main" val="0"/>
+                  </a:ext>
+                </a:extLst>
+              </a:blip>
+              <a:srcRect l="68126" t="49428" b="39643"/>
+              <a:stretch/>
+            </p:blipFill>
+            <p:spPr>
+              <a:xfrm>
+                <a:off x="5102925" y="14520994"/>
+                <a:ext cx="2258786" cy="555174"/>
+              </a:xfrm>
+              <a:prstGeom prst="rect">
+                <a:avLst/>
+              </a:prstGeom>
+            </p:spPr>
+          </p:pic>
+        </p:grpSp>
+      </p:grpSp>
+    </p:spTree>
+    <p:extLst>
+      <p:ext uri="{BB962C8B-B14F-4D97-AF65-F5344CB8AC3E}">
+        <p14:creationId xmlns:p14="http://schemas.microsoft.com/office/powerpoint/2010/main" val="1325168873"/>
       </p:ext>
     </p:extLst>
   </p:cSld>

</xml_diff>